<commit_message>
Add Codes Session n°2
</commit_message>
<xml_diff>
--- a/Présention Powersell Niv2.pptx
+++ b/Présention Powersell Niv2.pptx
@@ -6989,7 +6989,7 @@
           <a:p>
             <a:fld id="{B54C6BFA-D2AF-F448-A9FF-72486D536862}" type="datetimeFigureOut">
               <a:rPr lang="fr-FR" smtClean="0"/>
-              <a:t>13/12/2020</a:t>
+              <a:t>14/12/2020</a:t>
             </a:fld>
             <a:endParaRPr lang="fr-FR"/>
           </a:p>
@@ -7166,7 +7166,7 @@
           <a:p>
             <a:fld id="{70DCB972-112C-8545-A32B-124E522A55E9}" type="datetimeFigureOut">
               <a:rPr lang="fr-FR" smtClean="0"/>
-              <a:t>13/12/2020</a:t>
+              <a:t>14/12/2020</a:t>
             </a:fld>
             <a:endParaRPr lang="fr-FR"/>
           </a:p>
@@ -23567,7 +23567,12 @@
             <p:ph idx="1"/>
           </p:nvPr>
         </p:nvSpPr>
-        <p:spPr/>
+        <p:spPr>
+          <a:xfrm>
+            <a:off x="4772638" y="1847850"/>
+            <a:ext cx="10515600" cy="4351338"/>
+          </a:xfrm>
+        </p:spPr>
         <p:txBody>
           <a:bodyPr>
             <a:normAutofit fontScale="85000" lnSpcReduction="20000"/>
@@ -24674,7 +24679,7 @@
 </file>
 
 <file path=ppt/slides/slide41.xml><?xml version="1.0" encoding="utf-8"?>
-<p:sld xmlns:a="http://schemas.openxmlformats.org/drawingml/2006/main" xmlns:r="http://schemas.openxmlformats.org/officeDocument/2006/relationships" xmlns:p="http://schemas.openxmlformats.org/presentationml/2006/main">
+<p:sld xmlns:a="http://schemas.openxmlformats.org/drawingml/2006/main" xmlns:r="http://schemas.openxmlformats.org/officeDocument/2006/relationships" xmlns:p="http://schemas.openxmlformats.org/presentationml/2006/main" show="0">
   <p:cSld>
     <p:spTree>
       <p:nvGrpSpPr>
@@ -31255,6 +31260,21 @@
 </file>
 
 <file path=customXml/item1.xml><?xml version="1.0" encoding="utf-8"?>
+<?mso-contentType ?>
+<FormTemplates xmlns="http://schemas.microsoft.com/sharepoint/v3/contenttype/forms">
+  <Display>DocumentLibraryForm</Display>
+  <Edit>DocumentLibraryForm</Edit>
+  <New>DocumentLibraryForm</New>
+</FormTemplates>
+</file>
+
+<file path=customXml/item2.xml><?xml version="1.0" encoding="utf-8"?>
+<p:properties xmlns:p="http://schemas.microsoft.com/office/2006/metadata/properties" xmlns:xsi="http://www.w3.org/2001/XMLSchema-instance" xmlns:pc="http://schemas.microsoft.com/office/infopath/2007/PartnerControls">
+  <documentManagement/>
+</p:properties>
+</file>
+
+<file path=customXml/item3.xml><?xml version="1.0" encoding="utf-8"?>
 <ct:contentTypeSchema xmlns:ct="http://schemas.microsoft.com/office/2006/metadata/contentType" xmlns:ma="http://schemas.microsoft.com/office/2006/metadata/properties/metaAttributes" ct:_="" ma:_="" ma:contentTypeName="Document" ma:contentTypeID="0x0101004F49D8EF141C1E4AA8435A8FAED08903" ma:contentTypeVersion="7" ma:contentTypeDescription="Crée un document." ma:contentTypeScope="" ma:versionID="d9d2d12992ff9fda0fd72341003dde57">
   <xsd:schema xmlns:xsd="http://www.w3.org/2001/XMLSchema" xmlns:xs="http://www.w3.org/2001/XMLSchema" xmlns:p="http://schemas.microsoft.com/office/2006/metadata/properties" xmlns:ns2="4b935e17-eb95-44e3-ae94-4b8b8c4fd735" targetNamespace="http://schemas.microsoft.com/office/2006/metadata/properties" ma:root="true" ma:fieldsID="7868cdf98b89cb45723c84fc0520ad63" ns2:_="">
     <xsd:import namespace="4b935e17-eb95-44e3-ae94-4b8b8c4fd735"/>
@@ -31418,40 +31438,7 @@
 </ct:contentTypeSchema>
 </file>
 
-<file path=customXml/item2.xml><?xml version="1.0" encoding="utf-8"?>
-<?mso-contentType ?>
-<FormTemplates xmlns="http://schemas.microsoft.com/sharepoint/v3/contenttype/forms">
-  <Display>DocumentLibraryForm</Display>
-  <Edit>DocumentLibraryForm</Edit>
-  <New>DocumentLibraryForm</New>
-</FormTemplates>
-</file>
-
-<file path=customXml/item3.xml><?xml version="1.0" encoding="utf-8"?>
-<p:properties xmlns:p="http://schemas.microsoft.com/office/2006/metadata/properties" xmlns:xsi="http://www.w3.org/2001/XMLSchema-instance" xmlns:pc="http://schemas.microsoft.com/office/infopath/2007/PartnerControls">
-  <documentManagement/>
-</p:properties>
-</file>
-
 <file path=customXml/itemProps1.xml><?xml version="1.0" encoding="utf-8"?>
-<ds:datastoreItem xmlns:ds="http://schemas.openxmlformats.org/officeDocument/2006/customXml" ds:itemID="{A079D9C6-B368-41FE-8DE1-53FBEAA45FF2}">
-  <ds:schemaRefs>
-    <ds:schemaRef ds:uri="4b935e17-eb95-44e3-ae94-4b8b8c4fd735"/>
-    <ds:schemaRef ds:uri="http://purl.org/dc/elements/1.1/"/>
-    <ds:schemaRef ds:uri="http://purl.org/dc/terms/"/>
-    <ds:schemaRef ds:uri="http://schemas.microsoft.com/internal/obd"/>
-    <ds:schemaRef ds:uri="http://schemas.microsoft.com/office/2006/documentManagement/types"/>
-    <ds:schemaRef ds:uri="http://schemas.microsoft.com/office/2006/metadata/contentType"/>
-    <ds:schemaRef ds:uri="http://schemas.microsoft.com/office/2006/metadata/properties"/>
-    <ds:schemaRef ds:uri="http://schemas.microsoft.com/office/2006/metadata/properties/metaAttributes"/>
-    <ds:schemaRef ds:uri="http://schemas.microsoft.com/office/infopath/2007/PartnerControls"/>
-    <ds:schemaRef ds:uri="http://schemas.openxmlformats.org/package/2006/metadata/core-properties"/>
-    <ds:schemaRef ds:uri="http://www.w3.org/2001/XMLSchema"/>
-  </ds:schemaRefs>
-</ds:datastoreItem>
-</file>
-
-<file path=customXml/itemProps2.xml><?xml version="1.0" encoding="utf-8"?>
 <ds:datastoreItem xmlns:ds="http://schemas.openxmlformats.org/officeDocument/2006/customXml" ds:itemID="{B2036AF7-EC6A-442B-A67D-5E60715EF38B}">
   <ds:schemaRefs>
     <ds:schemaRef ds:uri="http://schemas.microsoft.com/sharepoint/v3/contenttype/forms"/>
@@ -31459,11 +31446,23 @@
 </ds:datastoreItem>
 </file>
 
-<file path=customXml/itemProps3.xml><?xml version="1.0" encoding="utf-8"?>
+<file path=customXml/itemProps2.xml><?xml version="1.0" encoding="utf-8"?>
 <ds:datastoreItem xmlns:ds="http://schemas.openxmlformats.org/officeDocument/2006/customXml" ds:itemID="{FBC65AAF-BA9D-4110-AA09-3EE47E22A39B}">
   <ds:schemaRefs>
     <ds:schemaRef ds:uri="http://schemas.microsoft.com/office/2006/metadata/properties"/>
-    <ds:schemaRef ds:uri="http://schemas.microsoft.com/office/infopath/2007/PartnerControls"/>
+    <ds:schemaRef ds:uri="http://www.w3.org/2000/xmlns/"/>
+  </ds:schemaRefs>
+</ds:datastoreItem>
+</file>
+
+<file path=customXml/itemProps3.xml><?xml version="1.0" encoding="utf-8"?>
+<ds:datastoreItem xmlns:ds="http://schemas.openxmlformats.org/officeDocument/2006/customXml" ds:itemID="{A079D9C6-B368-41FE-8DE1-53FBEAA45FF2}">
+  <ds:schemaRefs>
+    <ds:schemaRef ds:uri="http://schemas.microsoft.com/office/2006/metadata/contentType"/>
+    <ds:schemaRef ds:uri="http://schemas.microsoft.com/office/2006/metadata/properties/metaAttributes"/>
+    <ds:schemaRef ds:uri="http://www.w3.org/2000/xmlns/"/>
+    <ds:schemaRef ds:uri="http://www.w3.org/2001/XMLSchema"/>
+    <ds:schemaRef ds:uri="4b935e17-eb95-44e3-ae94-4b8b8c4fd735"/>
   </ds:schemaRefs>
 </ds:datastoreItem>
 </file>
</xml_diff>